<commit_message>
:pencil: Edit layout of the map
</commit_message>
<xml_diff>
--- a/CTF layout.pptx
+++ b/CTF layout.pptx
@@ -104,6 +104,11 @@
       </a:defRPr>
     </a:lvl9pPr>
   </p:defaultTextStyle>
+  <p:extLst>
+    <p:ext uri="{EFAFB233-063F-42B5-8137-9DF3F51BA10A}">
+      <p15:sldGuideLst xmlns:p15="http://schemas.microsoft.com/office/powerpoint/2012/main"/>
+    </p:ext>
+  </p:extLst>
 </p:presentation>
 </file>
 
@@ -5396,7 +5401,7 @@
         </p:nvSpPr>
         <p:spPr>
           <a:xfrm>
-            <a:off x="6576110" y="4212100"/>
+            <a:off x="7670142" y="5402619"/>
             <a:ext cx="1238495" cy="646331"/>
           </a:xfrm>
           <a:prstGeom prst="rect">
@@ -5435,7 +5440,7 @@
         </p:nvSpPr>
         <p:spPr>
           <a:xfrm>
-            <a:off x="5515571" y="5362277"/>
+            <a:off x="6567794" y="1087745"/>
             <a:ext cx="1238495" cy="646331"/>
           </a:xfrm>
           <a:prstGeom prst="rect">
@@ -5474,7 +5479,7 @@
         </p:nvSpPr>
         <p:spPr>
           <a:xfrm>
-            <a:off x="6487930" y="1103698"/>
+            <a:off x="7548688" y="2168538"/>
             <a:ext cx="1414854" cy="646331"/>
           </a:xfrm>
           <a:prstGeom prst="rect">
@@ -5523,7 +5528,7 @@
         </p:nvSpPr>
         <p:spPr>
           <a:xfrm>
-            <a:off x="7531117" y="2198775"/>
+            <a:off x="8583487" y="1050428"/>
             <a:ext cx="1414854" cy="646331"/>
           </a:xfrm>
           <a:prstGeom prst="rect">
@@ -5572,7 +5577,7 @@
         </p:nvSpPr>
         <p:spPr>
           <a:xfrm>
-            <a:off x="8448306" y="1382745"/>
+            <a:off x="5285558" y="5468186"/>
             <a:ext cx="1728871" cy="307777"/>
           </a:xfrm>
           <a:prstGeom prst="rect">
@@ -6026,7 +6031,7 @@
         </p:nvSpPr>
         <p:spPr>
           <a:xfrm>
-            <a:off x="7525175" y="5370599"/>
+            <a:off x="6398171" y="4282407"/>
             <a:ext cx="1629591" cy="646331"/>
           </a:xfrm>
           <a:prstGeom prst="rect">
@@ -6046,7 +6051,17 @@
                 <a:latin typeface="Times New Roman" panose="02020603050405020304" pitchFamily="18" charset="0"/>
                 <a:cs typeface="Times New Roman" panose="02020603050405020304" pitchFamily="18" charset="0"/>
               </a:rPr>
-              <a:t>SAY CHEESY PRIMES</a:t>
+              <a:t>DA VINCI</a:t>
+            </a:r>
+          </a:p>
+          <a:p>
+            <a:pPr algn="ctr"/>
+            <a:r>
+              <a:rPr lang="en-US" b="1" dirty="0">
+                <a:latin typeface="Times New Roman" panose="02020603050405020304" pitchFamily="18" charset="0"/>
+                <a:cs typeface="Times New Roman" panose="02020603050405020304" pitchFamily="18" charset="0"/>
+              </a:rPr>
+              <a:t>PRIMES</a:t>
             </a:r>
           </a:p>
         </p:txBody>

</xml_diff>